<commit_message>
FHIR-50630, FHIR-50674 - Fixed diagram to reflect referenced resources
</commit_message>
<xml_diff>
--- a/images/source/diagnostic-module-resources.source.pptx
+++ b/images/source/diagnostic-module-resources.source.pptx
@@ -197,7 +197,7 @@
           <a:p>
             <a:fld id="{42797D46-3E1F-AA47-B71F-665D7245492F}" type="datetimeFigureOut">
               <a:rPr lang="en-US" smtClean="0"/>
-              <a:t>1/30/24</a:t>
+              <a:t>7/25/2025</a:t>
             </a:fld>
             <a:endParaRPr lang="en-US"/>
           </a:p>
@@ -695,7 +695,7 @@
           <a:p>
             <a:fld id="{917D13A9-70C5-C241-B4D0-10405C2EB27E}" type="datetimeFigureOut">
               <a:rPr lang="en-US" smtClean="0"/>
-              <a:t>1/30/24</a:t>
+              <a:t>7/25/2025</a:t>
             </a:fld>
             <a:endParaRPr lang="en-US"/>
           </a:p>
@@ -893,7 +893,7 @@
           <a:p>
             <a:fld id="{917D13A9-70C5-C241-B4D0-10405C2EB27E}" type="datetimeFigureOut">
               <a:rPr lang="en-US" smtClean="0"/>
-              <a:t>1/30/24</a:t>
+              <a:t>7/25/2025</a:t>
             </a:fld>
             <a:endParaRPr lang="en-US"/>
           </a:p>
@@ -1101,7 +1101,7 @@
           <a:p>
             <a:fld id="{917D13A9-70C5-C241-B4D0-10405C2EB27E}" type="datetimeFigureOut">
               <a:rPr lang="en-US" smtClean="0"/>
-              <a:t>1/30/24</a:t>
+              <a:t>7/25/2025</a:t>
             </a:fld>
             <a:endParaRPr lang="en-US"/>
           </a:p>
@@ -1299,7 +1299,7 @@
           <a:p>
             <a:fld id="{917D13A9-70C5-C241-B4D0-10405C2EB27E}" type="datetimeFigureOut">
               <a:rPr lang="en-US" smtClean="0"/>
-              <a:t>1/30/24</a:t>
+              <a:t>7/25/2025</a:t>
             </a:fld>
             <a:endParaRPr lang="en-US"/>
           </a:p>
@@ -1574,7 +1574,7 @@
           <a:p>
             <a:fld id="{917D13A9-70C5-C241-B4D0-10405C2EB27E}" type="datetimeFigureOut">
               <a:rPr lang="en-US" smtClean="0"/>
-              <a:t>1/30/24</a:t>
+              <a:t>7/25/2025</a:t>
             </a:fld>
             <a:endParaRPr lang="en-US"/>
           </a:p>
@@ -1839,7 +1839,7 @@
           <a:p>
             <a:fld id="{917D13A9-70C5-C241-B4D0-10405C2EB27E}" type="datetimeFigureOut">
               <a:rPr lang="en-US" smtClean="0"/>
-              <a:t>1/30/24</a:t>
+              <a:t>7/25/2025</a:t>
             </a:fld>
             <a:endParaRPr lang="en-US"/>
           </a:p>
@@ -2251,7 +2251,7 @@
           <a:p>
             <a:fld id="{917D13A9-70C5-C241-B4D0-10405C2EB27E}" type="datetimeFigureOut">
               <a:rPr lang="en-US" smtClean="0"/>
-              <a:t>1/30/24</a:t>
+              <a:t>7/25/2025</a:t>
             </a:fld>
             <a:endParaRPr lang="en-US"/>
           </a:p>
@@ -2392,7 +2392,7 @@
           <a:p>
             <a:fld id="{917D13A9-70C5-C241-B4D0-10405C2EB27E}" type="datetimeFigureOut">
               <a:rPr lang="en-US" smtClean="0"/>
-              <a:t>1/30/24</a:t>
+              <a:t>7/25/2025</a:t>
             </a:fld>
             <a:endParaRPr lang="en-US"/>
           </a:p>
@@ -2505,7 +2505,7 @@
           <a:p>
             <a:fld id="{917D13A9-70C5-C241-B4D0-10405C2EB27E}" type="datetimeFigureOut">
               <a:rPr lang="en-US" smtClean="0"/>
-              <a:t>1/30/24</a:t>
+              <a:t>7/25/2025</a:t>
             </a:fld>
             <a:endParaRPr lang="en-US"/>
           </a:p>
@@ -2816,7 +2816,7 @@
           <a:p>
             <a:fld id="{917D13A9-70C5-C241-B4D0-10405C2EB27E}" type="datetimeFigureOut">
               <a:rPr lang="en-US" smtClean="0"/>
-              <a:t>1/30/24</a:t>
+              <a:t>7/25/2025</a:t>
             </a:fld>
             <a:endParaRPr lang="en-US"/>
           </a:p>
@@ -3104,7 +3104,7 @@
           <a:p>
             <a:fld id="{917D13A9-70C5-C241-B4D0-10405C2EB27E}" type="datetimeFigureOut">
               <a:rPr lang="en-US" smtClean="0"/>
-              <a:t>1/30/24</a:t>
+              <a:t>7/25/2025</a:t>
             </a:fld>
             <a:endParaRPr lang="en-US"/>
           </a:p>
@@ -3345,7 +3345,7 @@
           <a:p>
             <a:fld id="{917D13A9-70C5-C241-B4D0-10405C2EB27E}" type="datetimeFigureOut">
               <a:rPr lang="en-US" smtClean="0"/>
-              <a:t>1/30/24</a:t>
+              <a:t>7/25/2025</a:t>
             </a:fld>
             <a:endParaRPr lang="en-US"/>
           </a:p>
@@ -4028,18 +4028,13 @@
           <a:p>
             <a:pPr algn="ctr"/>
             <a:r>
-              <a:rPr lang="en-US" dirty="0" err="1">
+              <a:rPr lang="en-US" dirty="0">
                 <a:solidFill>
                   <a:schemeClr val="tx1"/>
                 </a:solidFill>
               </a:rPr>
               <a:t>ImagingStudy</a:t>
             </a:r>
-            <a:endParaRPr lang="en-US" dirty="0">
-              <a:solidFill>
-                <a:schemeClr val="tx1"/>
-              </a:solidFill>
-            </a:endParaRPr>
           </a:p>
         </p:txBody>
       </p:sp>
@@ -4126,7 +4121,7 @@
         </p:nvSpPr>
         <p:spPr>
           <a:xfrm>
-            <a:off x="8830235" y="1586312"/>
+            <a:off x="9018495" y="1586312"/>
             <a:ext cx="2528047" cy="914400"/>
           </a:xfrm>
           <a:prstGeom prst="roundRect">
@@ -4171,18 +4166,13 @@
           <a:p>
             <a:pPr algn="ctr"/>
             <a:r>
-              <a:rPr lang="en-US" dirty="0" err="1">
+              <a:rPr lang="en-US" dirty="0">
                 <a:solidFill>
                   <a:schemeClr val="tx1"/>
                 </a:solidFill>
               </a:rPr>
               <a:t>GenomicStudy</a:t>
             </a:r>
-            <a:endParaRPr lang="en-US" dirty="0">
-              <a:solidFill>
-                <a:schemeClr val="tx1"/>
-              </a:solidFill>
-            </a:endParaRPr>
           </a:p>
         </p:txBody>
       </p:sp>
@@ -4245,18 +4235,13 @@
           <a:p>
             <a:pPr algn="ctr"/>
             <a:r>
-              <a:rPr lang="en-US" dirty="0" err="1">
+              <a:rPr lang="en-US" dirty="0">
                 <a:solidFill>
                   <a:schemeClr val="tx1"/>
                 </a:solidFill>
               </a:rPr>
               <a:t>DocumentReference</a:t>
             </a:r>
-            <a:endParaRPr lang="en-US" dirty="0">
-              <a:solidFill>
-                <a:schemeClr val="tx1"/>
-              </a:solidFill>
-            </a:endParaRPr>
           </a:p>
         </p:txBody>
       </p:sp>
@@ -4270,14 +4255,15 @@
             </a:extLst>
           </p:cNvPr>
           <p:cNvCxnSpPr>
+            <a:cxnSpLocks/>
             <a:endCxn id="10" idx="1"/>
           </p:cNvCxnSpPr>
           <p:nvPr/>
         </p:nvCxnSpPr>
         <p:spPr>
           <a:xfrm>
-            <a:off x="8301318" y="3477865"/>
-            <a:ext cx="717177" cy="179295"/>
+            <a:off x="8309859" y="3657160"/>
+            <a:ext cx="708636" cy="0"/>
           </a:xfrm>
           <a:prstGeom prst="straightConnector1">
             <a:avLst/>
@@ -4320,8 +4306,8 @@
         </p:nvCxnSpPr>
         <p:spPr>
           <a:xfrm flipV="1">
-            <a:off x="8301318" y="2500712"/>
-            <a:ext cx="717177" cy="699248"/>
+            <a:off x="8301318" y="2406541"/>
+            <a:ext cx="717177" cy="793419"/>
           </a:xfrm>
           <a:prstGeom prst="straightConnector1">
             <a:avLst/>
@@ -4722,18 +4708,13 @@
           <a:p>
             <a:pPr algn="ctr"/>
             <a:r>
-              <a:rPr lang="en-US" dirty="0" err="1">
+              <a:rPr lang="en-US" dirty="0">
                 <a:solidFill>
                   <a:schemeClr val="tx1"/>
                 </a:solidFill>
               </a:rPr>
               <a:t>MolecularSequence</a:t>
             </a:r>
-            <a:endParaRPr lang="en-US" dirty="0">
-              <a:solidFill>
-                <a:schemeClr val="tx1"/>
-              </a:solidFill>
-            </a:endParaRPr>
           </a:p>
         </p:txBody>
       </p:sp>
@@ -4749,19 +4730,19 @@
           <p:cNvCxnSpPr>
             <a:cxnSpLocks/>
             <a:stCxn id="50" idx="3"/>
-            <a:endCxn id="56" idx="2"/>
+            <a:endCxn id="50" idx="2"/>
           </p:cNvCxnSpPr>
           <p:nvPr/>
         </p:nvCxnSpPr>
         <p:spPr>
           <a:xfrm flipH="1">
-            <a:off x="7690835" y="5253070"/>
-            <a:ext cx="603438" cy="440741"/>
+            <a:off x="7030250" y="5253070"/>
+            <a:ext cx="1264023" cy="457200"/>
           </a:xfrm>
           <a:prstGeom prst="bentConnector4">
             <a:avLst>
-              <a:gd name="adj1" fmla="val -37883"/>
-              <a:gd name="adj2" fmla="val 155602"/>
+              <a:gd name="adj1" fmla="val -18085"/>
+              <a:gd name="adj2" fmla="val 150000"/>
             </a:avLst>
           </a:prstGeom>
           <a:ln w="38100">
@@ -4797,18 +4778,19 @@
           </p:cNvPr>
           <p:cNvCxnSpPr>
             <a:cxnSpLocks/>
+            <a:endCxn id="8" idx="2"/>
           </p:cNvCxnSpPr>
           <p:nvPr/>
         </p:nvCxnSpPr>
         <p:spPr>
-          <a:xfrm flipH="1">
-            <a:off x="8159219" y="3766014"/>
-            <a:ext cx="135054" cy="395323"/>
+          <a:xfrm rot="10800000">
+            <a:off x="7037296" y="4114360"/>
+            <a:ext cx="1065185" cy="12700"/>
           </a:xfrm>
           <a:prstGeom prst="bentConnector4">
             <a:avLst>
-              <a:gd name="adj1" fmla="val -169266"/>
-              <a:gd name="adj2" fmla="val 173478"/>
+              <a:gd name="adj1" fmla="val 1522"/>
+              <a:gd name="adj2" fmla="val -2565354"/>
             </a:avLst>
           </a:prstGeom>
           <a:ln w="38100">
@@ -5125,18 +5107,13 @@
           <a:p>
             <a:pPr algn="ctr"/>
             <a:r>
-              <a:rPr lang="en-US" dirty="0" err="1">
+              <a:rPr lang="en-US" dirty="0">
                 <a:solidFill>
                   <a:schemeClr val="tx1"/>
                 </a:solidFill>
               </a:rPr>
               <a:t>ImagingSelection</a:t>
             </a:r>
-            <a:endParaRPr lang="en-US" dirty="0">
-              <a:solidFill>
-                <a:schemeClr val="tx1"/>
-              </a:solidFill>
-            </a:endParaRPr>
           </a:p>
         </p:txBody>
       </p:sp>
@@ -5245,18 +5222,13 @@
           <a:p>
             <a:pPr algn="ctr"/>
             <a:r>
-              <a:rPr lang="en-US" dirty="0" err="1">
+              <a:rPr lang="en-US" dirty="0">
                 <a:solidFill>
                   <a:schemeClr val="tx1"/>
                 </a:solidFill>
               </a:rPr>
               <a:t>BodyStructure</a:t>
             </a:r>
-            <a:endParaRPr lang="en-US" dirty="0">
-              <a:solidFill>
-                <a:schemeClr val="tx1"/>
-              </a:solidFill>
-            </a:endParaRPr>
           </a:p>
         </p:txBody>
       </p:sp>
@@ -5376,6 +5348,213 @@
             <a:avLst>
               <a:gd name="adj1" fmla="val 5387994"/>
             </a:avLst>
+          </a:prstGeom>
+          <a:ln w="38100">
+            <a:solidFill>
+              <a:schemeClr val="tx1"/>
+            </a:solidFill>
+            <a:tailEnd type="triangle"/>
+          </a:ln>
+        </p:spPr>
+        <p:style>
+          <a:lnRef idx="1">
+            <a:schemeClr val="accent1"/>
+          </a:lnRef>
+          <a:fillRef idx="0">
+            <a:schemeClr val="accent1"/>
+          </a:fillRef>
+          <a:effectRef idx="0">
+            <a:schemeClr val="accent1"/>
+          </a:effectRef>
+          <a:fontRef idx="minor">
+            <a:schemeClr val="tx1"/>
+          </a:fontRef>
+        </p:style>
+      </p:cxnSp>
+      <p:sp>
+        <p:nvSpPr>
+          <p:cNvPr id="2" name="Rounded Rectangle 49">
+            <a:extLst>
+              <a:ext uri="{FF2B5EF4-FFF2-40B4-BE49-F238E27FC236}">
+                <a16:creationId xmlns:a16="http://schemas.microsoft.com/office/drawing/2014/main" id="{B1D7C1B0-5FEB-8EBC-6756-AD50B8488FD6}"/>
+              </a:ext>
+            </a:extLst>
+          </p:cNvPr>
+          <p:cNvSpPr/>
+          <p:nvPr/>
+        </p:nvSpPr>
+        <p:spPr>
+          <a:xfrm>
+            <a:off x="9018495" y="4795870"/>
+            <a:ext cx="2528047" cy="914400"/>
+          </a:xfrm>
+          <a:prstGeom prst="roundRect">
+            <a:avLst/>
+          </a:prstGeom>
+          <a:solidFill>
+            <a:schemeClr val="accent1">
+              <a:lumMod val="40000"/>
+              <a:lumOff val="60000"/>
+            </a:schemeClr>
+          </a:solidFill>
+          <a:ln>
+            <a:noFill/>
+          </a:ln>
+          <a:effectLst>
+            <a:outerShdw blurRad="50800" dist="38100" dir="2700000" algn="tl" rotWithShape="0">
+              <a:prstClr val="black">
+                <a:alpha val="40000"/>
+              </a:prstClr>
+            </a:outerShdw>
+          </a:effectLst>
+        </p:spPr>
+        <p:style>
+          <a:lnRef idx="2">
+            <a:schemeClr val="accent1">
+              <a:shade val="50000"/>
+            </a:schemeClr>
+          </a:lnRef>
+          <a:fillRef idx="1">
+            <a:schemeClr val="accent1"/>
+          </a:fillRef>
+          <a:effectRef idx="0">
+            <a:schemeClr val="accent1"/>
+          </a:effectRef>
+          <a:fontRef idx="minor">
+            <a:schemeClr val="lt1"/>
+          </a:fontRef>
+        </p:style>
+        <p:txBody>
+          <a:bodyPr rtlCol="0" anchor="ctr"/>
+          <a:lstStyle/>
+          <a:p>
+            <a:pPr algn="ctr"/>
+            <a:r>
+              <a:rPr lang="en-US" dirty="0">
+                <a:solidFill>
+                  <a:schemeClr val="tx1"/>
+                </a:solidFill>
+              </a:rPr>
+              <a:t>MolecularDefinition</a:t>
+            </a:r>
+          </a:p>
+        </p:txBody>
+      </p:sp>
+      <p:cxnSp>
+        <p:nvCxnSpPr>
+          <p:cNvPr id="3" name="Elbow Connector 53">
+            <a:extLst>
+              <a:ext uri="{FF2B5EF4-FFF2-40B4-BE49-F238E27FC236}">
+                <a16:creationId xmlns:a16="http://schemas.microsoft.com/office/drawing/2014/main" id="{013AFE27-E89B-9ABF-EC41-DD4F03F76046}"/>
+              </a:ext>
+            </a:extLst>
+          </p:cNvPr>
+          <p:cNvCxnSpPr>
+            <a:cxnSpLocks/>
+            <a:stCxn id="2" idx="3"/>
+            <a:endCxn id="2" idx="2"/>
+          </p:cNvCxnSpPr>
+          <p:nvPr/>
+        </p:nvCxnSpPr>
+        <p:spPr>
+          <a:xfrm flipH="1">
+            <a:off x="10282519" y="5253070"/>
+            <a:ext cx="1264023" cy="457200"/>
+          </a:xfrm>
+          <a:prstGeom prst="bentConnector4">
+            <a:avLst>
+              <a:gd name="adj1" fmla="val -18085"/>
+              <a:gd name="adj2" fmla="val 150000"/>
+            </a:avLst>
+          </a:prstGeom>
+          <a:ln w="38100">
+            <a:solidFill>
+              <a:schemeClr val="tx1"/>
+            </a:solidFill>
+            <a:tailEnd type="triangle"/>
+          </a:ln>
+        </p:spPr>
+        <p:style>
+          <a:lnRef idx="1">
+            <a:schemeClr val="accent1"/>
+          </a:lnRef>
+          <a:fillRef idx="0">
+            <a:schemeClr val="accent1"/>
+          </a:fillRef>
+          <a:effectRef idx="0">
+            <a:schemeClr val="accent1"/>
+          </a:effectRef>
+          <a:fontRef idx="minor">
+            <a:schemeClr val="tx1"/>
+          </a:fontRef>
+        </p:style>
+      </p:cxnSp>
+      <p:cxnSp>
+        <p:nvCxnSpPr>
+          <p:cNvPr id="14" name="Straight Arrow Connector 13">
+            <a:extLst>
+              <a:ext uri="{FF2B5EF4-FFF2-40B4-BE49-F238E27FC236}">
+                <a16:creationId xmlns:a16="http://schemas.microsoft.com/office/drawing/2014/main" id="{DD1FDE0D-CB48-1C3A-0D8E-C04E491EE91E}"/>
+              </a:ext>
+            </a:extLst>
+          </p:cNvPr>
+          <p:cNvCxnSpPr>
+            <a:cxnSpLocks/>
+            <a:stCxn id="2" idx="0"/>
+          </p:cNvCxnSpPr>
+          <p:nvPr/>
+        </p:nvCxnSpPr>
+        <p:spPr>
+          <a:xfrm flipH="1" flipV="1">
+            <a:off x="10282518" y="4114360"/>
+            <a:ext cx="1" cy="681510"/>
+          </a:xfrm>
+          <a:prstGeom prst="straightConnector1">
+            <a:avLst/>
+          </a:prstGeom>
+          <a:ln w="38100">
+            <a:solidFill>
+              <a:schemeClr val="tx1"/>
+            </a:solidFill>
+            <a:tailEnd type="triangle"/>
+          </a:ln>
+        </p:spPr>
+        <p:style>
+          <a:lnRef idx="1">
+            <a:schemeClr val="accent1"/>
+          </a:lnRef>
+          <a:fillRef idx="0">
+            <a:schemeClr val="accent1"/>
+          </a:fillRef>
+          <a:effectRef idx="0">
+            <a:schemeClr val="accent1"/>
+          </a:effectRef>
+          <a:fontRef idx="minor">
+            <a:schemeClr val="tx1"/>
+          </a:fontRef>
+        </p:style>
+      </p:cxnSp>
+      <p:cxnSp>
+        <p:nvCxnSpPr>
+          <p:cNvPr id="41" name="Straight Arrow Connector 40">
+            <a:extLst>
+              <a:ext uri="{FF2B5EF4-FFF2-40B4-BE49-F238E27FC236}">
+                <a16:creationId xmlns:a16="http://schemas.microsoft.com/office/drawing/2014/main" id="{D89D7BC7-4949-A997-0F93-AF5ADB895B9E}"/>
+              </a:ext>
+            </a:extLst>
+          </p:cNvPr>
+          <p:cNvCxnSpPr>
+            <a:cxnSpLocks/>
+          </p:cNvCxnSpPr>
+          <p:nvPr/>
+        </p:nvCxnSpPr>
+        <p:spPr>
+          <a:xfrm>
+            <a:off x="8326478" y="3779591"/>
+            <a:ext cx="770623" cy="1034017"/>
+          </a:xfrm>
+          <a:prstGeom prst="straightConnector1">
+            <a:avLst/>
           </a:prstGeom>
           <a:ln w="38100">
             <a:solidFill>

</xml_diff>

<commit_message>
updating the source pptx to remove MolSeq and add relations from obs to MolDef
</commit_message>
<xml_diff>
--- a/images/source/diagnostic-module-resources.source.pptx
+++ b/images/source/diagnostic-module-resources.source.pptx
@@ -197,7 +197,7 @@
           <a:p>
             <a:fld id="{42797D46-3E1F-AA47-B71F-665D7245492F}" type="datetimeFigureOut">
               <a:rPr lang="en-US" smtClean="0"/>
-              <a:t>7/25/2025</a:t>
+              <a:t>8/20/2025</a:t>
             </a:fld>
             <a:endParaRPr lang="en-US"/>
           </a:p>
@@ -695,7 +695,7 @@
           <a:p>
             <a:fld id="{917D13A9-70C5-C241-B4D0-10405C2EB27E}" type="datetimeFigureOut">
               <a:rPr lang="en-US" smtClean="0"/>
-              <a:t>7/25/2025</a:t>
+              <a:t>8/20/2025</a:t>
             </a:fld>
             <a:endParaRPr lang="en-US"/>
           </a:p>
@@ -893,7 +893,7 @@
           <a:p>
             <a:fld id="{917D13A9-70C5-C241-B4D0-10405C2EB27E}" type="datetimeFigureOut">
               <a:rPr lang="en-US" smtClean="0"/>
-              <a:t>7/25/2025</a:t>
+              <a:t>8/20/2025</a:t>
             </a:fld>
             <a:endParaRPr lang="en-US"/>
           </a:p>
@@ -1101,7 +1101,7 @@
           <a:p>
             <a:fld id="{917D13A9-70C5-C241-B4D0-10405C2EB27E}" type="datetimeFigureOut">
               <a:rPr lang="en-US" smtClean="0"/>
-              <a:t>7/25/2025</a:t>
+              <a:t>8/20/2025</a:t>
             </a:fld>
             <a:endParaRPr lang="en-US"/>
           </a:p>
@@ -1299,7 +1299,7 @@
           <a:p>
             <a:fld id="{917D13A9-70C5-C241-B4D0-10405C2EB27E}" type="datetimeFigureOut">
               <a:rPr lang="en-US" smtClean="0"/>
-              <a:t>7/25/2025</a:t>
+              <a:t>8/20/2025</a:t>
             </a:fld>
             <a:endParaRPr lang="en-US"/>
           </a:p>
@@ -1574,7 +1574,7 @@
           <a:p>
             <a:fld id="{917D13A9-70C5-C241-B4D0-10405C2EB27E}" type="datetimeFigureOut">
               <a:rPr lang="en-US" smtClean="0"/>
-              <a:t>7/25/2025</a:t>
+              <a:t>8/20/2025</a:t>
             </a:fld>
             <a:endParaRPr lang="en-US"/>
           </a:p>
@@ -1839,7 +1839,7 @@
           <a:p>
             <a:fld id="{917D13A9-70C5-C241-B4D0-10405C2EB27E}" type="datetimeFigureOut">
               <a:rPr lang="en-US" smtClean="0"/>
-              <a:t>7/25/2025</a:t>
+              <a:t>8/20/2025</a:t>
             </a:fld>
             <a:endParaRPr lang="en-US"/>
           </a:p>
@@ -2251,7 +2251,7 @@
           <a:p>
             <a:fld id="{917D13A9-70C5-C241-B4D0-10405C2EB27E}" type="datetimeFigureOut">
               <a:rPr lang="en-US" smtClean="0"/>
-              <a:t>7/25/2025</a:t>
+              <a:t>8/20/2025</a:t>
             </a:fld>
             <a:endParaRPr lang="en-US"/>
           </a:p>
@@ -2392,7 +2392,7 @@
           <a:p>
             <a:fld id="{917D13A9-70C5-C241-B4D0-10405C2EB27E}" type="datetimeFigureOut">
               <a:rPr lang="en-US" smtClean="0"/>
-              <a:t>7/25/2025</a:t>
+              <a:t>8/20/2025</a:t>
             </a:fld>
             <a:endParaRPr lang="en-US"/>
           </a:p>
@@ -2505,7 +2505,7 @@
           <a:p>
             <a:fld id="{917D13A9-70C5-C241-B4D0-10405C2EB27E}" type="datetimeFigureOut">
               <a:rPr lang="en-US" smtClean="0"/>
-              <a:t>7/25/2025</a:t>
+              <a:t>8/20/2025</a:t>
             </a:fld>
             <a:endParaRPr lang="en-US"/>
           </a:p>
@@ -2816,7 +2816,7 @@
           <a:p>
             <a:fld id="{917D13A9-70C5-C241-B4D0-10405C2EB27E}" type="datetimeFigureOut">
               <a:rPr lang="en-US" smtClean="0"/>
-              <a:t>7/25/2025</a:t>
+              <a:t>8/20/2025</a:t>
             </a:fld>
             <a:endParaRPr lang="en-US"/>
           </a:p>
@@ -3104,7 +3104,7 @@
           <a:p>
             <a:fld id="{917D13A9-70C5-C241-B4D0-10405C2EB27E}" type="datetimeFigureOut">
               <a:rPr lang="en-US" smtClean="0"/>
-              <a:t>7/25/2025</a:t>
+              <a:t>8/20/2025</a:t>
             </a:fld>
             <a:endParaRPr lang="en-US"/>
           </a:p>
@@ -3345,7 +3345,7 @@
           <a:p>
             <a:fld id="{917D13A9-70C5-C241-B4D0-10405C2EB27E}" type="datetimeFigureOut">
               <a:rPr lang="en-US" smtClean="0"/>
-              <a:t>7/25/2025</a:t>
+              <a:t>8/20/2025</a:t>
             </a:fld>
             <a:endParaRPr lang="en-US"/>
           </a:p>
@@ -4513,52 +4513,6 @@
           </a:fontRef>
         </p:style>
       </p:cxnSp>
-      <p:sp>
-        <p:nvSpPr>
-          <p:cNvPr id="56" name="Rectangle 55">
-            <a:extLst>
-              <a:ext uri="{FF2B5EF4-FFF2-40B4-BE49-F238E27FC236}">
-                <a16:creationId xmlns:a16="http://schemas.microsoft.com/office/drawing/2014/main" id="{0F38BCDC-A6A2-0B43-B330-E6ED9A706049}"/>
-              </a:ext>
-            </a:extLst>
-          </p:cNvPr>
-          <p:cNvSpPr/>
-          <p:nvPr/>
-        </p:nvSpPr>
-        <p:spPr>
-          <a:xfrm>
-            <a:off x="7608788" y="5428377"/>
-            <a:ext cx="164093" cy="265434"/>
-          </a:xfrm>
-          <a:prstGeom prst="rect">
-            <a:avLst/>
-          </a:prstGeom>
-        </p:spPr>
-        <p:style>
-          <a:lnRef idx="2">
-            <a:schemeClr val="accent1">
-              <a:shade val="50000"/>
-            </a:schemeClr>
-          </a:lnRef>
-          <a:fillRef idx="1">
-            <a:schemeClr val="accent1"/>
-          </a:fillRef>
-          <a:effectRef idx="0">
-            <a:schemeClr val="accent1"/>
-          </a:effectRef>
-          <a:fontRef idx="minor">
-            <a:schemeClr val="lt1"/>
-          </a:fontRef>
-        </p:style>
-        <p:txBody>
-          <a:bodyPr rtlCol="0" anchor="ctr"/>
-          <a:lstStyle/>
-          <a:p>
-            <a:pPr algn="ctr"/>
-            <a:endParaRPr lang="en-US"/>
-          </a:p>
-        </p:txBody>
-      </p:sp>
       <p:cxnSp>
         <p:nvCxnSpPr>
           <p:cNvPr id="44" name="Straight Arrow Connector 43">
@@ -4626,124 +4580,6 @@
           </a:xfrm>
           <a:prstGeom prst="straightConnector1">
             <a:avLst/>
-          </a:prstGeom>
-          <a:ln w="38100">
-            <a:solidFill>
-              <a:schemeClr val="tx1"/>
-            </a:solidFill>
-            <a:tailEnd type="triangle"/>
-          </a:ln>
-        </p:spPr>
-        <p:style>
-          <a:lnRef idx="1">
-            <a:schemeClr val="accent1"/>
-          </a:lnRef>
-          <a:fillRef idx="0">
-            <a:schemeClr val="accent1"/>
-          </a:fillRef>
-          <a:effectRef idx="0">
-            <a:schemeClr val="accent1"/>
-          </a:effectRef>
-          <a:fontRef idx="minor">
-            <a:schemeClr val="tx1"/>
-          </a:fontRef>
-        </p:style>
-      </p:cxnSp>
-      <p:sp>
-        <p:nvSpPr>
-          <p:cNvPr id="50" name="Rounded Rectangle 49">
-            <a:extLst>
-              <a:ext uri="{FF2B5EF4-FFF2-40B4-BE49-F238E27FC236}">
-                <a16:creationId xmlns:a16="http://schemas.microsoft.com/office/drawing/2014/main" id="{EA247B42-F5CC-A36F-F7DB-08FEE0A6EF52}"/>
-              </a:ext>
-            </a:extLst>
-          </p:cNvPr>
-          <p:cNvSpPr/>
-          <p:nvPr/>
-        </p:nvSpPr>
-        <p:spPr>
-          <a:xfrm>
-            <a:off x="5766226" y="4795870"/>
-            <a:ext cx="2528047" cy="914400"/>
-          </a:xfrm>
-          <a:prstGeom prst="roundRect">
-            <a:avLst/>
-          </a:prstGeom>
-          <a:solidFill>
-            <a:schemeClr val="accent1">
-              <a:lumMod val="40000"/>
-              <a:lumOff val="60000"/>
-            </a:schemeClr>
-          </a:solidFill>
-          <a:ln>
-            <a:noFill/>
-          </a:ln>
-          <a:effectLst>
-            <a:outerShdw blurRad="50800" dist="38100" dir="2700000" algn="tl" rotWithShape="0">
-              <a:prstClr val="black">
-                <a:alpha val="40000"/>
-              </a:prstClr>
-            </a:outerShdw>
-          </a:effectLst>
-        </p:spPr>
-        <p:style>
-          <a:lnRef idx="2">
-            <a:schemeClr val="accent1">
-              <a:shade val="50000"/>
-            </a:schemeClr>
-          </a:lnRef>
-          <a:fillRef idx="1">
-            <a:schemeClr val="accent1"/>
-          </a:fillRef>
-          <a:effectRef idx="0">
-            <a:schemeClr val="accent1"/>
-          </a:effectRef>
-          <a:fontRef idx="minor">
-            <a:schemeClr val="lt1"/>
-          </a:fontRef>
-        </p:style>
-        <p:txBody>
-          <a:bodyPr rtlCol="0" anchor="ctr"/>
-          <a:lstStyle/>
-          <a:p>
-            <a:pPr algn="ctr"/>
-            <a:r>
-              <a:rPr lang="en-US" dirty="0">
-                <a:solidFill>
-                  <a:schemeClr val="tx1"/>
-                </a:solidFill>
-              </a:rPr>
-              <a:t>MolecularSequence</a:t>
-            </a:r>
-          </a:p>
-        </p:txBody>
-      </p:sp>
-      <p:cxnSp>
-        <p:nvCxnSpPr>
-          <p:cNvPr id="54" name="Elbow Connector 53">
-            <a:extLst>
-              <a:ext uri="{FF2B5EF4-FFF2-40B4-BE49-F238E27FC236}">
-                <a16:creationId xmlns:a16="http://schemas.microsoft.com/office/drawing/2014/main" id="{B7D52F1B-7B7E-8E26-6BE6-57B59D6DCE3E}"/>
-              </a:ext>
-            </a:extLst>
-          </p:cNvPr>
-          <p:cNvCxnSpPr>
-            <a:cxnSpLocks/>
-            <a:stCxn id="50" idx="3"/>
-            <a:endCxn id="50" idx="2"/>
-          </p:cNvCxnSpPr>
-          <p:nvPr/>
-        </p:nvCxnSpPr>
-        <p:spPr>
-          <a:xfrm flipH="1">
-            <a:off x="7030250" y="5253070"/>
-            <a:ext cx="1264023" cy="457200"/>
-          </a:xfrm>
-          <a:prstGeom prst="bentConnector4">
-            <a:avLst>
-              <a:gd name="adj1" fmla="val -18085"/>
-              <a:gd name="adj2" fmla="val 150000"/>
-            </a:avLst>
           </a:prstGeom>
           <a:ln w="38100">
             <a:solidFill>
@@ -4834,94 +4670,6 @@
           <a:xfrm flipH="1">
             <a:off x="3244652" y="4173938"/>
             <a:ext cx="1938296" cy="923529"/>
-          </a:xfrm>
-          <a:prstGeom prst="straightConnector1">
-            <a:avLst/>
-          </a:prstGeom>
-          <a:ln w="38100">
-            <a:solidFill>
-              <a:schemeClr val="tx1"/>
-            </a:solidFill>
-            <a:tailEnd type="triangle"/>
-          </a:ln>
-        </p:spPr>
-        <p:style>
-          <a:lnRef idx="1">
-            <a:schemeClr val="accent1"/>
-          </a:lnRef>
-          <a:fillRef idx="0">
-            <a:schemeClr val="accent1"/>
-          </a:fillRef>
-          <a:effectRef idx="0">
-            <a:schemeClr val="accent1"/>
-          </a:effectRef>
-          <a:fontRef idx="minor">
-            <a:schemeClr val="tx1"/>
-          </a:fontRef>
-        </p:style>
-      </p:cxnSp>
-      <p:cxnSp>
-        <p:nvCxnSpPr>
-          <p:cNvPr id="71" name="Straight Arrow Connector 70">
-            <a:extLst>
-              <a:ext uri="{FF2B5EF4-FFF2-40B4-BE49-F238E27FC236}">
-                <a16:creationId xmlns:a16="http://schemas.microsoft.com/office/drawing/2014/main" id="{C081CD6D-B879-20A2-91EB-9621999CAC97}"/>
-              </a:ext>
-            </a:extLst>
-          </p:cNvPr>
-          <p:cNvCxnSpPr>
-            <a:cxnSpLocks/>
-          </p:cNvCxnSpPr>
-          <p:nvPr/>
-        </p:nvCxnSpPr>
-        <p:spPr>
-          <a:xfrm flipV="1">
-            <a:off x="6350974" y="4173938"/>
-            <a:ext cx="0" cy="621932"/>
-          </a:xfrm>
-          <a:prstGeom prst="straightConnector1">
-            <a:avLst/>
-          </a:prstGeom>
-          <a:ln w="38100">
-            <a:solidFill>
-              <a:schemeClr val="tx1"/>
-            </a:solidFill>
-            <a:tailEnd type="triangle"/>
-          </a:ln>
-        </p:spPr>
-        <p:style>
-          <a:lnRef idx="1">
-            <a:schemeClr val="accent1"/>
-          </a:lnRef>
-          <a:fillRef idx="0">
-            <a:schemeClr val="accent1"/>
-          </a:fillRef>
-          <a:effectRef idx="0">
-            <a:schemeClr val="accent1"/>
-          </a:effectRef>
-          <a:fontRef idx="minor">
-            <a:schemeClr val="tx1"/>
-          </a:fontRef>
-        </p:style>
-      </p:cxnSp>
-      <p:cxnSp>
-        <p:nvCxnSpPr>
-          <p:cNvPr id="72" name="Straight Arrow Connector 71">
-            <a:extLst>
-              <a:ext uri="{FF2B5EF4-FFF2-40B4-BE49-F238E27FC236}">
-                <a16:creationId xmlns:a16="http://schemas.microsoft.com/office/drawing/2014/main" id="{764E31BD-2E89-3896-5362-C12EC9D8356F}"/>
-              </a:ext>
-            </a:extLst>
-          </p:cNvPr>
-          <p:cNvCxnSpPr>
-            <a:cxnSpLocks/>
-          </p:cNvCxnSpPr>
-          <p:nvPr/>
-        </p:nvCxnSpPr>
-        <p:spPr>
-          <a:xfrm>
-            <a:off x="6574972" y="4222943"/>
-            <a:ext cx="0" cy="572927"/>
           </a:xfrm>
           <a:prstGeom prst="straightConnector1">
             <a:avLst/>
@@ -5371,6 +5119,191 @@
           </a:fontRef>
         </p:style>
       </p:cxnSp>
+      <p:cxnSp>
+        <p:nvCxnSpPr>
+          <p:cNvPr id="3" name="Elbow Connector 53">
+            <a:extLst>
+              <a:ext uri="{FF2B5EF4-FFF2-40B4-BE49-F238E27FC236}">
+                <a16:creationId xmlns:a16="http://schemas.microsoft.com/office/drawing/2014/main" id="{013AFE27-E89B-9ABF-EC41-DD4F03F76046}"/>
+              </a:ext>
+            </a:extLst>
+          </p:cNvPr>
+          <p:cNvCxnSpPr>
+            <a:cxnSpLocks/>
+            <a:stCxn id="2" idx="3"/>
+            <a:endCxn id="2" idx="2"/>
+          </p:cNvCxnSpPr>
+          <p:nvPr/>
+        </p:nvCxnSpPr>
+        <p:spPr>
+          <a:xfrm flipH="1">
+            <a:off x="8668227" y="5493460"/>
+            <a:ext cx="1264023" cy="457200"/>
+          </a:xfrm>
+          <a:prstGeom prst="bentConnector4">
+            <a:avLst>
+              <a:gd name="adj1" fmla="val -18085"/>
+              <a:gd name="adj2" fmla="val 150000"/>
+            </a:avLst>
+          </a:prstGeom>
+          <a:ln w="38100">
+            <a:solidFill>
+              <a:schemeClr val="tx1"/>
+            </a:solidFill>
+            <a:tailEnd type="triangle"/>
+          </a:ln>
+        </p:spPr>
+        <p:style>
+          <a:lnRef idx="1">
+            <a:schemeClr val="accent1"/>
+          </a:lnRef>
+          <a:fillRef idx="0">
+            <a:schemeClr val="accent1"/>
+          </a:fillRef>
+          <a:effectRef idx="0">
+            <a:schemeClr val="accent1"/>
+          </a:effectRef>
+          <a:fontRef idx="minor">
+            <a:schemeClr val="tx1"/>
+          </a:fontRef>
+        </p:style>
+      </p:cxnSp>
+      <p:cxnSp>
+        <p:nvCxnSpPr>
+          <p:cNvPr id="14" name="Straight Arrow Connector 13">
+            <a:extLst>
+              <a:ext uri="{FF2B5EF4-FFF2-40B4-BE49-F238E27FC236}">
+                <a16:creationId xmlns:a16="http://schemas.microsoft.com/office/drawing/2014/main" id="{DD1FDE0D-CB48-1C3A-0D8E-C04E491EE91E}"/>
+              </a:ext>
+            </a:extLst>
+          </p:cNvPr>
+          <p:cNvCxnSpPr>
+            <a:cxnSpLocks/>
+          </p:cNvCxnSpPr>
+          <p:nvPr/>
+        </p:nvCxnSpPr>
+        <p:spPr>
+          <a:xfrm flipV="1">
+            <a:off x="9466857" y="4120710"/>
+            <a:ext cx="0" cy="921900"/>
+          </a:xfrm>
+          <a:prstGeom prst="straightConnector1">
+            <a:avLst/>
+          </a:prstGeom>
+          <a:ln w="38100">
+            <a:solidFill>
+              <a:schemeClr val="tx1"/>
+            </a:solidFill>
+            <a:tailEnd type="triangle"/>
+          </a:ln>
+        </p:spPr>
+        <p:style>
+          <a:lnRef idx="1">
+            <a:schemeClr val="accent1"/>
+          </a:lnRef>
+          <a:fillRef idx="0">
+            <a:schemeClr val="accent1"/>
+          </a:fillRef>
+          <a:effectRef idx="0">
+            <a:schemeClr val="accent1"/>
+          </a:effectRef>
+          <a:fontRef idx="minor">
+            <a:schemeClr val="tx1"/>
+          </a:fontRef>
+        </p:style>
+      </p:cxnSp>
+      <p:cxnSp>
+        <p:nvCxnSpPr>
+          <p:cNvPr id="20" name="Elbow Connector 65">
+            <a:extLst>
+              <a:ext uri="{FF2B5EF4-FFF2-40B4-BE49-F238E27FC236}">
+                <a16:creationId xmlns:a16="http://schemas.microsoft.com/office/drawing/2014/main" id="{39BBB178-6529-C6CE-FF66-4D30E1FECB19}"/>
+              </a:ext>
+            </a:extLst>
+          </p:cNvPr>
+          <p:cNvCxnSpPr>
+            <a:cxnSpLocks/>
+          </p:cNvCxnSpPr>
+          <p:nvPr/>
+        </p:nvCxnSpPr>
+        <p:spPr>
+          <a:xfrm rot="16200000" flipV="1">
+            <a:off x="6055606" y="4325209"/>
+            <a:ext cx="1636664" cy="1214965"/>
+          </a:xfrm>
+          <a:prstGeom prst="bentConnector3">
+            <a:avLst>
+              <a:gd name="adj1" fmla="val 1474"/>
+            </a:avLst>
+          </a:prstGeom>
+          <a:ln w="38100">
+            <a:solidFill>
+              <a:schemeClr val="tx1"/>
+            </a:solidFill>
+            <a:tailEnd type="triangle"/>
+          </a:ln>
+        </p:spPr>
+        <p:style>
+          <a:lnRef idx="1">
+            <a:schemeClr val="accent1"/>
+          </a:lnRef>
+          <a:fillRef idx="0">
+            <a:schemeClr val="accent1"/>
+          </a:fillRef>
+          <a:effectRef idx="0">
+            <a:schemeClr val="accent1"/>
+          </a:effectRef>
+          <a:fontRef idx="minor">
+            <a:schemeClr val="tx1"/>
+          </a:fontRef>
+        </p:style>
+      </p:cxnSp>
+      <p:cxnSp>
+        <p:nvCxnSpPr>
+          <p:cNvPr id="25" name="Elbow Connector 65">
+            <a:extLst>
+              <a:ext uri="{FF2B5EF4-FFF2-40B4-BE49-F238E27FC236}">
+                <a16:creationId xmlns:a16="http://schemas.microsoft.com/office/drawing/2014/main" id="{BE4ADCC8-45C3-0441-F29F-54D464A973BE}"/>
+              </a:ext>
+            </a:extLst>
+          </p:cNvPr>
+          <p:cNvCxnSpPr>
+            <a:cxnSpLocks/>
+          </p:cNvCxnSpPr>
+          <p:nvPr/>
+        </p:nvCxnSpPr>
+        <p:spPr>
+          <a:xfrm rot="16200000" flipH="1">
+            <a:off x="6403639" y="4344168"/>
+            <a:ext cx="1230372" cy="770755"/>
+          </a:xfrm>
+          <a:prstGeom prst="bentConnector3">
+            <a:avLst>
+              <a:gd name="adj1" fmla="val 100942"/>
+            </a:avLst>
+          </a:prstGeom>
+          <a:ln w="38100">
+            <a:solidFill>
+              <a:schemeClr val="tx1"/>
+            </a:solidFill>
+            <a:tailEnd type="triangle"/>
+          </a:ln>
+        </p:spPr>
+        <p:style>
+          <a:lnRef idx="1">
+            <a:schemeClr val="accent1"/>
+          </a:lnRef>
+          <a:fillRef idx="0">
+            <a:schemeClr val="accent1"/>
+          </a:fillRef>
+          <a:effectRef idx="0">
+            <a:schemeClr val="accent1"/>
+          </a:effectRef>
+          <a:fontRef idx="minor">
+            <a:schemeClr val="tx1"/>
+          </a:fontRef>
+        </p:style>
+      </p:cxnSp>
       <p:sp>
         <p:nvSpPr>
           <p:cNvPr id="2" name="Rounded Rectangle 49">
@@ -5385,7 +5318,7 @@
         </p:nvSpPr>
         <p:spPr>
           <a:xfrm>
-            <a:off x="9018495" y="4795870"/>
+            <a:off x="7404203" y="5036260"/>
             <a:ext cx="2528047" cy="914400"/>
           </a:xfrm>
           <a:prstGeom prst="roundRect">
@@ -5440,144 +5373,6 @@
           </a:p>
         </p:txBody>
       </p:sp>
-      <p:cxnSp>
-        <p:nvCxnSpPr>
-          <p:cNvPr id="3" name="Elbow Connector 53">
-            <a:extLst>
-              <a:ext uri="{FF2B5EF4-FFF2-40B4-BE49-F238E27FC236}">
-                <a16:creationId xmlns:a16="http://schemas.microsoft.com/office/drawing/2014/main" id="{013AFE27-E89B-9ABF-EC41-DD4F03F76046}"/>
-              </a:ext>
-            </a:extLst>
-          </p:cNvPr>
-          <p:cNvCxnSpPr>
-            <a:cxnSpLocks/>
-            <a:stCxn id="2" idx="3"/>
-            <a:endCxn id="2" idx="2"/>
-          </p:cNvCxnSpPr>
-          <p:nvPr/>
-        </p:nvCxnSpPr>
-        <p:spPr>
-          <a:xfrm flipH="1">
-            <a:off x="10282519" y="5253070"/>
-            <a:ext cx="1264023" cy="457200"/>
-          </a:xfrm>
-          <a:prstGeom prst="bentConnector4">
-            <a:avLst>
-              <a:gd name="adj1" fmla="val -18085"/>
-              <a:gd name="adj2" fmla="val 150000"/>
-            </a:avLst>
-          </a:prstGeom>
-          <a:ln w="38100">
-            <a:solidFill>
-              <a:schemeClr val="tx1"/>
-            </a:solidFill>
-            <a:tailEnd type="triangle"/>
-          </a:ln>
-        </p:spPr>
-        <p:style>
-          <a:lnRef idx="1">
-            <a:schemeClr val="accent1"/>
-          </a:lnRef>
-          <a:fillRef idx="0">
-            <a:schemeClr val="accent1"/>
-          </a:fillRef>
-          <a:effectRef idx="0">
-            <a:schemeClr val="accent1"/>
-          </a:effectRef>
-          <a:fontRef idx="minor">
-            <a:schemeClr val="tx1"/>
-          </a:fontRef>
-        </p:style>
-      </p:cxnSp>
-      <p:cxnSp>
-        <p:nvCxnSpPr>
-          <p:cNvPr id="14" name="Straight Arrow Connector 13">
-            <a:extLst>
-              <a:ext uri="{FF2B5EF4-FFF2-40B4-BE49-F238E27FC236}">
-                <a16:creationId xmlns:a16="http://schemas.microsoft.com/office/drawing/2014/main" id="{DD1FDE0D-CB48-1C3A-0D8E-C04E491EE91E}"/>
-              </a:ext>
-            </a:extLst>
-          </p:cNvPr>
-          <p:cNvCxnSpPr>
-            <a:cxnSpLocks/>
-            <a:stCxn id="2" idx="0"/>
-          </p:cNvCxnSpPr>
-          <p:nvPr/>
-        </p:nvCxnSpPr>
-        <p:spPr>
-          <a:xfrm flipH="1" flipV="1">
-            <a:off x="10282518" y="4114360"/>
-            <a:ext cx="1" cy="681510"/>
-          </a:xfrm>
-          <a:prstGeom prst="straightConnector1">
-            <a:avLst/>
-          </a:prstGeom>
-          <a:ln w="38100">
-            <a:solidFill>
-              <a:schemeClr val="tx1"/>
-            </a:solidFill>
-            <a:tailEnd type="triangle"/>
-          </a:ln>
-        </p:spPr>
-        <p:style>
-          <a:lnRef idx="1">
-            <a:schemeClr val="accent1"/>
-          </a:lnRef>
-          <a:fillRef idx="0">
-            <a:schemeClr val="accent1"/>
-          </a:fillRef>
-          <a:effectRef idx="0">
-            <a:schemeClr val="accent1"/>
-          </a:effectRef>
-          <a:fontRef idx="minor">
-            <a:schemeClr val="tx1"/>
-          </a:fontRef>
-        </p:style>
-      </p:cxnSp>
-      <p:cxnSp>
-        <p:nvCxnSpPr>
-          <p:cNvPr id="41" name="Straight Arrow Connector 40">
-            <a:extLst>
-              <a:ext uri="{FF2B5EF4-FFF2-40B4-BE49-F238E27FC236}">
-                <a16:creationId xmlns:a16="http://schemas.microsoft.com/office/drawing/2014/main" id="{D89D7BC7-4949-A997-0F93-AF5ADB895B9E}"/>
-              </a:ext>
-            </a:extLst>
-          </p:cNvPr>
-          <p:cNvCxnSpPr>
-            <a:cxnSpLocks/>
-          </p:cNvCxnSpPr>
-          <p:nvPr/>
-        </p:nvCxnSpPr>
-        <p:spPr>
-          <a:xfrm>
-            <a:off x="8326478" y="3779591"/>
-            <a:ext cx="770623" cy="1034017"/>
-          </a:xfrm>
-          <a:prstGeom prst="straightConnector1">
-            <a:avLst/>
-          </a:prstGeom>
-          <a:ln w="38100">
-            <a:solidFill>
-              <a:schemeClr val="tx1"/>
-            </a:solidFill>
-            <a:tailEnd type="triangle"/>
-          </a:ln>
-        </p:spPr>
-        <p:style>
-          <a:lnRef idx="1">
-            <a:schemeClr val="accent1"/>
-          </a:lnRef>
-          <a:fillRef idx="0">
-            <a:schemeClr val="accent1"/>
-          </a:fillRef>
-          <a:effectRef idx="0">
-            <a:schemeClr val="accent1"/>
-          </a:effectRef>
-          <a:fontRef idx="minor">
-            <a:schemeClr val="tx1"/>
-          </a:fontRef>
-        </p:style>
-      </p:cxnSp>
     </p:spTree>
     <p:extLst>
       <p:ext uri="{BB962C8B-B14F-4D97-AF65-F5344CB8AC3E}">
@@ -6179,4 +5974,10 @@
     </a:ext>
   </a:extLst>
 </a:theme>
+</file>
+
+<file path=docMetadata/LabelInfo.xml><?xml version="1.0" encoding="utf-8"?>
+<clbl:labelList xmlns:clbl="http://schemas.microsoft.com/office/2020/mipLabelMetadata">
+  <clbl:label id="{990794cc-8ced-4156-9787-a1fbf819c752}" enabled="1" method="Standard" siteId="{a25fff9c-3f63-4fb2-9a8a-d9bdd0321f9a}" contentBits="0" removed="0"/>
+</clbl:labelList>
 </file>
</xml_diff>

<commit_message>
FHIR-51647, FHIR-50365 Fixing Dx Madule page after bad git merge issues
</commit_message>
<xml_diff>
--- a/images/source/diagnostic-module-resources.source.pptx
+++ b/images/source/diagnostic-module-resources.source.pptx
@@ -197,7 +197,7 @@
           <a:p>
             <a:fld id="{42797D46-3E1F-AA47-B71F-665D7245492F}" type="datetimeFigureOut">
               <a:rPr lang="en-US" smtClean="0"/>
-              <a:t>8/20/2025</a:t>
+              <a:t>8/28/2025</a:t>
             </a:fld>
             <a:endParaRPr lang="en-US"/>
           </a:p>
@@ -695,7 +695,7 @@
           <a:p>
             <a:fld id="{917D13A9-70C5-C241-B4D0-10405C2EB27E}" type="datetimeFigureOut">
               <a:rPr lang="en-US" smtClean="0"/>
-              <a:t>8/20/2025</a:t>
+              <a:t>8/28/2025</a:t>
             </a:fld>
             <a:endParaRPr lang="en-US"/>
           </a:p>
@@ -893,7 +893,7 @@
           <a:p>
             <a:fld id="{917D13A9-70C5-C241-B4D0-10405C2EB27E}" type="datetimeFigureOut">
               <a:rPr lang="en-US" smtClean="0"/>
-              <a:t>8/20/2025</a:t>
+              <a:t>8/28/2025</a:t>
             </a:fld>
             <a:endParaRPr lang="en-US"/>
           </a:p>
@@ -1101,7 +1101,7 @@
           <a:p>
             <a:fld id="{917D13A9-70C5-C241-B4D0-10405C2EB27E}" type="datetimeFigureOut">
               <a:rPr lang="en-US" smtClean="0"/>
-              <a:t>8/20/2025</a:t>
+              <a:t>8/28/2025</a:t>
             </a:fld>
             <a:endParaRPr lang="en-US"/>
           </a:p>
@@ -1299,7 +1299,7 @@
           <a:p>
             <a:fld id="{917D13A9-70C5-C241-B4D0-10405C2EB27E}" type="datetimeFigureOut">
               <a:rPr lang="en-US" smtClean="0"/>
-              <a:t>8/20/2025</a:t>
+              <a:t>8/28/2025</a:t>
             </a:fld>
             <a:endParaRPr lang="en-US"/>
           </a:p>
@@ -1574,7 +1574,7 @@
           <a:p>
             <a:fld id="{917D13A9-70C5-C241-B4D0-10405C2EB27E}" type="datetimeFigureOut">
               <a:rPr lang="en-US" smtClean="0"/>
-              <a:t>8/20/2025</a:t>
+              <a:t>8/28/2025</a:t>
             </a:fld>
             <a:endParaRPr lang="en-US"/>
           </a:p>
@@ -1839,7 +1839,7 @@
           <a:p>
             <a:fld id="{917D13A9-70C5-C241-B4D0-10405C2EB27E}" type="datetimeFigureOut">
               <a:rPr lang="en-US" smtClean="0"/>
-              <a:t>8/20/2025</a:t>
+              <a:t>8/28/2025</a:t>
             </a:fld>
             <a:endParaRPr lang="en-US"/>
           </a:p>
@@ -2251,7 +2251,7 @@
           <a:p>
             <a:fld id="{917D13A9-70C5-C241-B4D0-10405C2EB27E}" type="datetimeFigureOut">
               <a:rPr lang="en-US" smtClean="0"/>
-              <a:t>8/20/2025</a:t>
+              <a:t>8/28/2025</a:t>
             </a:fld>
             <a:endParaRPr lang="en-US"/>
           </a:p>
@@ -2392,7 +2392,7 @@
           <a:p>
             <a:fld id="{917D13A9-70C5-C241-B4D0-10405C2EB27E}" type="datetimeFigureOut">
               <a:rPr lang="en-US" smtClean="0"/>
-              <a:t>8/20/2025</a:t>
+              <a:t>8/28/2025</a:t>
             </a:fld>
             <a:endParaRPr lang="en-US"/>
           </a:p>
@@ -2505,7 +2505,7 @@
           <a:p>
             <a:fld id="{917D13A9-70C5-C241-B4D0-10405C2EB27E}" type="datetimeFigureOut">
               <a:rPr lang="en-US" smtClean="0"/>
-              <a:t>8/20/2025</a:t>
+              <a:t>8/28/2025</a:t>
             </a:fld>
             <a:endParaRPr lang="en-US"/>
           </a:p>
@@ -2816,7 +2816,7 @@
           <a:p>
             <a:fld id="{917D13A9-70C5-C241-B4D0-10405C2EB27E}" type="datetimeFigureOut">
               <a:rPr lang="en-US" smtClean="0"/>
-              <a:t>8/20/2025</a:t>
+              <a:t>8/28/2025</a:t>
             </a:fld>
             <a:endParaRPr lang="en-US"/>
           </a:p>
@@ -3104,7 +3104,7 @@
           <a:p>
             <a:fld id="{917D13A9-70C5-C241-B4D0-10405C2EB27E}" type="datetimeFigureOut">
               <a:rPr lang="en-US" smtClean="0"/>
-              <a:t>8/20/2025</a:t>
+              <a:t>8/28/2025</a:t>
             </a:fld>
             <a:endParaRPr lang="en-US"/>
           </a:p>
@@ -3345,7 +3345,7 @@
           <a:p>
             <a:fld id="{917D13A9-70C5-C241-B4D0-10405C2EB27E}" type="datetimeFigureOut">
               <a:rPr lang="en-US" smtClean="0"/>
-              <a:t>8/20/2025</a:t>
+              <a:t>8/28/2025</a:t>
             </a:fld>
             <a:endParaRPr lang="en-US"/>
           </a:p>
@@ -5370,6 +5370,97 @@
               </a:rPr>
               <a:t>MolecularDefinition</a:t>
             </a:r>
+          </a:p>
+        </p:txBody>
+      </p:sp>
+      <p:sp>
+        <p:nvSpPr>
+          <p:cNvPr id="11" name="TextBox 10">
+            <a:extLst>
+              <a:ext uri="{FF2B5EF4-FFF2-40B4-BE49-F238E27FC236}">
+                <a16:creationId xmlns:a16="http://schemas.microsoft.com/office/drawing/2014/main" id="{E5D20670-C081-25F4-9D2A-70E68C8E9236}"/>
+              </a:ext>
+            </a:extLst>
+          </p:cNvPr>
+          <p:cNvSpPr txBox="1"/>
+          <p:nvPr/>
+        </p:nvSpPr>
+        <p:spPr>
+          <a:xfrm>
+            <a:off x="9632168" y="5042610"/>
+            <a:ext cx="300082" cy="369332"/>
+          </a:xfrm>
+          <a:prstGeom prst="rect">
+            <a:avLst/>
+          </a:prstGeom>
+          <a:noFill/>
+        </p:spPr>
+        <p:txBody>
+          <a:bodyPr wrap="none" rtlCol="0">
+            <a:spAutoFit/>
+          </a:bodyPr>
+          <a:lstStyle/>
+          <a:p>
+            <a:r>
+              <a:rPr lang="en-CA" dirty="0"/>
+              <a:t>*</a:t>
+            </a:r>
+          </a:p>
+        </p:txBody>
+      </p:sp>
+      <p:sp>
+        <p:nvSpPr>
+          <p:cNvPr id="15" name="TextBox 14">
+            <a:extLst>
+              <a:ext uri="{FF2B5EF4-FFF2-40B4-BE49-F238E27FC236}">
+                <a16:creationId xmlns:a16="http://schemas.microsoft.com/office/drawing/2014/main" id="{8A5261A9-9C90-8B07-A7E1-8D040A35D4A1}"/>
+              </a:ext>
+            </a:extLst>
+          </p:cNvPr>
+          <p:cNvSpPr txBox="1"/>
+          <p:nvPr/>
+        </p:nvSpPr>
+        <p:spPr>
+          <a:xfrm>
+            <a:off x="6494501" y="6270333"/>
+            <a:ext cx="5672643" cy="369332"/>
+          </a:xfrm>
+          <a:prstGeom prst="rect">
+            <a:avLst/>
+          </a:prstGeom>
+          <a:noFill/>
+        </p:spPr>
+        <p:txBody>
+          <a:bodyPr wrap="none" rtlCol="0">
+            <a:spAutoFit/>
+          </a:bodyPr>
+          <a:lstStyle/>
+          <a:p>
+            <a:r>
+              <a:rPr lang="en-CA" dirty="0"/>
+              <a:t>*</a:t>
+            </a:r>
+            <a:r>
+              <a:rPr lang="en-US" sz="1400" dirty="0"/>
+              <a:t>The </a:t>
+            </a:r>
+            <a:r>
+              <a:rPr lang="en-US" sz="1400" b="1" dirty="0"/>
+              <a:t>MolecularDefinition</a:t>
+            </a:r>
+            <a:r>
+              <a:rPr lang="en-US" sz="1400" dirty="0"/>
+              <a:t> resource has replaced </a:t>
+            </a:r>
+            <a:r>
+              <a:rPr lang="en-US" sz="1400" b="1" dirty="0"/>
+              <a:t>MolecularSequence</a:t>
+            </a:r>
+            <a:r>
+              <a:rPr lang="en-US" sz="1400" dirty="0"/>
+              <a:t> in R6</a:t>
+            </a:r>
+            <a:endParaRPr lang="en-CA" sz="1400" dirty="0"/>
           </a:p>
         </p:txBody>
       </p:sp>

</xml_diff>